<commit_message>
add testing & evaluation in ppt
</commit_message>
<xml_diff>
--- a/BANGKIT-ASSIGNMENT5.pptx
+++ b/BANGKIT-ASSIGNMENT5.pptx
@@ -2,21 +2,23 @@
 <file path=ppt/presentation.xml><?xml version="1.0" encoding="utf-8"?>
 <p:presentation xmlns:a="http://schemas.openxmlformats.org/drawingml/2006/main" xmlns:r="http://schemas.openxmlformats.org/officeDocument/2006/relationships" xmlns:mc="http://schemas.openxmlformats.org/markup-compatibility/2006" xmlns:mv="urn:schemas-microsoft-com:mac:vml" xmlns:p="http://schemas.openxmlformats.org/presentationml/2006/main" xmlns:c="http://schemas.openxmlformats.org/drawingml/2006/chart" xmlns:dgm="http://schemas.openxmlformats.org/drawingml/2006/diagram" xmlns:o="urn:schemas-microsoft-com:office:office" xmlns:v="urn:schemas-microsoft-com:vml" xmlns:pvml="urn:schemas-microsoft-com:office:powerpoint" xmlns:com="http://schemas.openxmlformats.org/drawingml/2006/compatibility" xmlns:p14="http://schemas.microsoft.com/office/powerpoint/2010/main" xmlns:p15="http://schemas.microsoft.com/office/powerpoint/2012/main" autoCompressPictures="0" strictFirstAndLastChars="0" saveSubsetFonts="1">
   <p:sldMasterIdLst>
-    <p:sldMasterId id="2147483670" r:id="rId4"/>
-    <p:sldMasterId id="2147483671" r:id="rId5"/>
+    <p:sldMasterId id="2147483670" r:id="rId5"/>
+    <p:sldMasterId id="2147483671" r:id="rId6"/>
   </p:sldMasterIdLst>
   <p:notesMasterIdLst>
-    <p:notesMasterId r:id="rId6"/>
+    <p:notesMasterId r:id="rId7"/>
   </p:notesMasterIdLst>
   <p:sldIdLst>
-    <p:sldId id="256" r:id="rId7"/>
-    <p:sldId id="257" r:id="rId8"/>
-    <p:sldId id="258" r:id="rId9"/>
-    <p:sldId id="259" r:id="rId10"/>
-    <p:sldId id="260" r:id="rId11"/>
-    <p:sldId id="261" r:id="rId12"/>
-    <p:sldId id="262" r:id="rId13"/>
-    <p:sldId id="263" r:id="rId14"/>
+    <p:sldId id="256" r:id="rId8"/>
+    <p:sldId id="257" r:id="rId9"/>
+    <p:sldId id="258" r:id="rId10"/>
+    <p:sldId id="259" r:id="rId11"/>
+    <p:sldId id="260" r:id="rId12"/>
+    <p:sldId id="261" r:id="rId13"/>
+    <p:sldId id="262" r:id="rId14"/>
+    <p:sldId id="263" r:id="rId15"/>
+    <p:sldId id="264" r:id="rId16"/>
+    <p:sldId id="265" r:id="rId17"/>
   </p:sldIdLst>
   <p:sldSz cy="5143500" cx="9144000"/>
   <p:notesSz cx="6858000" cy="9144000"/>
@@ -793,6 +795,105 @@
 </p:notes>
 </file>
 
+<file path=ppt/notesSlides/notesSlide10.xml><?xml version="1.0" encoding="utf-8"?>
+<p:notes xmlns:a="http://schemas.openxmlformats.org/drawingml/2006/main" xmlns:r="http://schemas.openxmlformats.org/officeDocument/2006/relationships" xmlns:mc="http://schemas.openxmlformats.org/markup-compatibility/2006" xmlns:mv="urn:schemas-microsoft-com:mac:vml" xmlns:p="http://schemas.openxmlformats.org/presentationml/2006/main" xmlns:c="http://schemas.openxmlformats.org/drawingml/2006/chart" xmlns:dgm="http://schemas.openxmlformats.org/drawingml/2006/diagram" xmlns:o="urn:schemas-microsoft-com:office:office" xmlns:v="urn:schemas-microsoft-com:vml" xmlns:pvml="urn:schemas-microsoft-com:office:powerpoint" xmlns:com="http://schemas.openxmlformats.org/drawingml/2006/compatibility" xmlns:p14="http://schemas.microsoft.com/office/powerpoint/2010/main" xmlns:p15="http://schemas.microsoft.com/office/powerpoint/2012/main" showMasterPhAnim="0" showMasterSp="0">
+  <p:cSld>
+    <p:spTree>
+      <p:nvGrpSpPr>
+        <p:cNvPr id="205" name="Shape 205"/>
+        <p:cNvGrpSpPr/>
+        <p:nvPr/>
+      </p:nvGrpSpPr>
+      <p:grpSpPr>
+        <a:xfrm>
+          <a:off x="0" y="0"/>
+          <a:ext cx="0" cy="0"/>
+          <a:chOff x="0" y="0"/>
+          <a:chExt cx="0" cy="0"/>
+        </a:xfrm>
+      </p:grpSpPr>
+      <p:sp>
+        <p:nvSpPr>
+          <p:cNvPr id="206" name="Google Shape;206;g8291b5b381_0_218:notes"/>
+          <p:cNvSpPr txBox="1"/>
+          <p:nvPr>
+            <p:ph idx="1" type="body"/>
+          </p:nvPr>
+        </p:nvSpPr>
+        <p:spPr>
+          <a:xfrm>
+            <a:off x="685800" y="4343400"/>
+            <a:ext cx="5486400" cy="4114800"/>
+          </a:xfrm>
+          <a:prstGeom prst="rect">
+            <a:avLst/>
+          </a:prstGeom>
+        </p:spPr>
+        <p:txBody>
+          <a:bodyPr anchorCtr="0" anchor="t" bIns="91425" lIns="91425" spcFirstLastPara="1" rIns="91425" wrap="square" tIns="91425">
+            <a:noAutofit/>
+          </a:bodyPr>
+          <a:lstStyle/>
+          <a:p>
+            <a:pPr indent="0" lvl="0" marL="0" rtl="0" algn="l">
+              <a:spcBef>
+                <a:spcPts val="0"/>
+              </a:spcBef>
+              <a:spcAft>
+                <a:spcPts val="0"/>
+              </a:spcAft>
+              <a:buNone/>
+            </a:pPr>
+            <a:r>
+              <a:t/>
+            </a:r>
+            <a:endParaRPr/>
+          </a:p>
+        </p:txBody>
+      </p:sp>
+      <p:sp>
+        <p:nvSpPr>
+          <p:cNvPr id="207" name="Google Shape;207;g8291b5b381_0_218:notes"/>
+          <p:cNvSpPr/>
+          <p:nvPr>
+            <p:ph idx="2" type="sldImg"/>
+          </p:nvPr>
+        </p:nvSpPr>
+        <p:spPr>
+          <a:xfrm>
+            <a:off x="1143225" y="685800"/>
+            <a:ext cx="4572300" cy="3429000"/>
+          </a:xfrm>
+          <a:custGeom>
+            <a:rect b="b" l="l" r="r" t="t"/>
+            <a:pathLst>
+              <a:path extrusionOk="0" h="120000" w="120000">
+                <a:moveTo>
+                  <a:pt x="0" y="0"/>
+                </a:moveTo>
+                <a:lnTo>
+                  <a:pt x="120000" y="0"/>
+                </a:lnTo>
+                <a:lnTo>
+                  <a:pt x="120000" y="120000"/>
+                </a:lnTo>
+                <a:lnTo>
+                  <a:pt x="0" y="120000"/>
+                </a:lnTo>
+                <a:close/>
+              </a:path>
+            </a:pathLst>
+          </a:custGeom>
+        </p:spPr>
+      </p:sp>
+    </p:spTree>
+  </p:cSld>
+  <p:clrMapOvr>
+    <a:masterClrMapping/>
+  </p:clrMapOvr>
+</p:notes>
+</file>
+
 <file path=ppt/notesSlides/notesSlide2.xml><?xml version="1.0" encoding="utf-8"?>
 <p:notes xmlns:a="http://schemas.openxmlformats.org/drawingml/2006/main" xmlns:r="http://schemas.openxmlformats.org/officeDocument/2006/relationships" xmlns:mc="http://schemas.openxmlformats.org/markup-compatibility/2006" xmlns:mv="urn:schemas-microsoft-com:mac:vml" xmlns:p="http://schemas.openxmlformats.org/presentationml/2006/main" xmlns:c="http://schemas.openxmlformats.org/drawingml/2006/chart" xmlns:dgm="http://schemas.openxmlformats.org/drawingml/2006/diagram" xmlns:o="urn:schemas-microsoft-com:office:office" xmlns:v="urn:schemas-microsoft-com:vml" xmlns:pvml="urn:schemas-microsoft-com:office:powerpoint" xmlns:com="http://schemas.openxmlformats.org/drawingml/2006/compatibility" xmlns:p14="http://schemas.microsoft.com/office/powerpoint/2010/main" xmlns:p15="http://schemas.microsoft.com/office/powerpoint/2012/main" showMasterPhAnim="0" showMasterSp="0">
   <p:cSld>
@@ -1406,7 +1507,7 @@
       </p:grpSpPr>
       <p:sp>
         <p:nvSpPr>
-          <p:cNvPr id="189" name="Google Shape;189;g8291b5b381_0_218:notes"/>
+          <p:cNvPr id="189" name="Google Shape;189;g8291b5b381_8_0:notes"/>
           <p:cNvSpPr txBox="1"/>
           <p:nvPr>
             <p:ph idx="1" type="body"/>
@@ -1445,7 +1546,106 @@
       </p:sp>
       <p:sp>
         <p:nvSpPr>
-          <p:cNvPr id="190" name="Google Shape;190;g8291b5b381_0_218:notes"/>
+          <p:cNvPr id="190" name="Google Shape;190;g8291b5b381_8_0:notes"/>
+          <p:cNvSpPr/>
+          <p:nvPr>
+            <p:ph idx="2" type="sldImg"/>
+          </p:nvPr>
+        </p:nvSpPr>
+        <p:spPr>
+          <a:xfrm>
+            <a:off x="1143225" y="685800"/>
+            <a:ext cx="4572300" cy="3429000"/>
+          </a:xfrm>
+          <a:custGeom>
+            <a:rect b="b" l="l" r="r" t="t"/>
+            <a:pathLst>
+              <a:path extrusionOk="0" h="120000" w="120000">
+                <a:moveTo>
+                  <a:pt x="0" y="0"/>
+                </a:moveTo>
+                <a:lnTo>
+                  <a:pt x="120000" y="0"/>
+                </a:lnTo>
+                <a:lnTo>
+                  <a:pt x="120000" y="120000"/>
+                </a:lnTo>
+                <a:lnTo>
+                  <a:pt x="0" y="120000"/>
+                </a:lnTo>
+                <a:close/>
+              </a:path>
+            </a:pathLst>
+          </a:custGeom>
+        </p:spPr>
+      </p:sp>
+    </p:spTree>
+  </p:cSld>
+  <p:clrMapOvr>
+    <a:masterClrMapping/>
+  </p:clrMapOvr>
+</p:notes>
+</file>
+
+<file path=ppt/notesSlides/notesSlide9.xml><?xml version="1.0" encoding="utf-8"?>
+<p:notes xmlns:a="http://schemas.openxmlformats.org/drawingml/2006/main" xmlns:r="http://schemas.openxmlformats.org/officeDocument/2006/relationships" xmlns:mc="http://schemas.openxmlformats.org/markup-compatibility/2006" xmlns:mv="urn:schemas-microsoft-com:mac:vml" xmlns:p="http://schemas.openxmlformats.org/presentationml/2006/main" xmlns:c="http://schemas.openxmlformats.org/drawingml/2006/chart" xmlns:dgm="http://schemas.openxmlformats.org/drawingml/2006/diagram" xmlns:o="urn:schemas-microsoft-com:office:office" xmlns:v="urn:schemas-microsoft-com:vml" xmlns:pvml="urn:schemas-microsoft-com:office:powerpoint" xmlns:com="http://schemas.openxmlformats.org/drawingml/2006/compatibility" xmlns:p14="http://schemas.microsoft.com/office/powerpoint/2010/main" xmlns:p15="http://schemas.microsoft.com/office/powerpoint/2012/main" showMasterPhAnim="0" showMasterSp="0">
+  <p:cSld>
+    <p:spTree>
+      <p:nvGrpSpPr>
+        <p:cNvPr id="196" name="Shape 196"/>
+        <p:cNvGrpSpPr/>
+        <p:nvPr/>
+      </p:nvGrpSpPr>
+      <p:grpSpPr>
+        <a:xfrm>
+          <a:off x="0" y="0"/>
+          <a:ext cx="0" cy="0"/>
+          <a:chOff x="0" y="0"/>
+          <a:chExt cx="0" cy="0"/>
+        </a:xfrm>
+      </p:grpSpPr>
+      <p:sp>
+        <p:nvSpPr>
+          <p:cNvPr id="197" name="Google Shape;197;g8291b5b381_8_10:notes"/>
+          <p:cNvSpPr txBox="1"/>
+          <p:nvPr>
+            <p:ph idx="1" type="body"/>
+          </p:nvPr>
+        </p:nvSpPr>
+        <p:spPr>
+          <a:xfrm>
+            <a:off x="685800" y="4343400"/>
+            <a:ext cx="5486400" cy="4114800"/>
+          </a:xfrm>
+          <a:prstGeom prst="rect">
+            <a:avLst/>
+          </a:prstGeom>
+        </p:spPr>
+        <p:txBody>
+          <a:bodyPr anchorCtr="0" anchor="t" bIns="91425" lIns="91425" spcFirstLastPara="1" rIns="91425" wrap="square" tIns="91425">
+            <a:noAutofit/>
+          </a:bodyPr>
+          <a:lstStyle/>
+          <a:p>
+            <a:pPr indent="0" lvl="0" marL="0" rtl="0" algn="l">
+              <a:spcBef>
+                <a:spcPts val="0"/>
+              </a:spcBef>
+              <a:spcAft>
+                <a:spcPts val="0"/>
+              </a:spcAft>
+              <a:buNone/>
+            </a:pPr>
+            <a:r>
+              <a:t/>
+            </a:r>
+            <a:endParaRPr/>
+          </a:p>
+        </p:txBody>
+      </p:sp>
+      <p:sp>
+        <p:nvSpPr>
+          <p:cNvPr id="198" name="Google Shape;198;g8291b5b381_8_10:notes"/>
           <p:cNvSpPr/>
           <p:nvPr>
             <p:ph idx="2" type="sldImg"/>
@@ -17328,6 +17528,277 @@
 </p:sld>
 </file>
 
+<file path=ppt/slides/slide10.xml><?xml version="1.0" encoding="utf-8"?>
+<p:sld xmlns:a="http://schemas.openxmlformats.org/drawingml/2006/main" xmlns:r="http://schemas.openxmlformats.org/officeDocument/2006/relationships" xmlns:mc="http://schemas.openxmlformats.org/markup-compatibility/2006" xmlns:mv="urn:schemas-microsoft-com:mac:vml" xmlns:p="http://schemas.openxmlformats.org/presentationml/2006/main" xmlns:c="http://schemas.openxmlformats.org/drawingml/2006/chart" xmlns:dgm="http://schemas.openxmlformats.org/drawingml/2006/diagram" xmlns:o="urn:schemas-microsoft-com:office:office" xmlns:v="urn:schemas-microsoft-com:vml" xmlns:pvml="urn:schemas-microsoft-com:office:powerpoint" xmlns:com="http://schemas.openxmlformats.org/drawingml/2006/compatibility" xmlns:p14="http://schemas.microsoft.com/office/powerpoint/2010/main" xmlns:p15="http://schemas.microsoft.com/office/powerpoint/2012/main">
+  <p:cSld>
+    <p:spTree>
+      <p:nvGrpSpPr>
+        <p:cNvPr id="208" name="Shape 208"/>
+        <p:cNvGrpSpPr/>
+        <p:nvPr/>
+      </p:nvGrpSpPr>
+      <p:grpSpPr>
+        <a:xfrm>
+          <a:off x="0" y="0"/>
+          <a:ext cx="0" cy="0"/>
+          <a:chOff x="0" y="0"/>
+          <a:chExt cx="0" cy="0"/>
+        </a:xfrm>
+      </p:grpSpPr>
+      <p:sp>
+        <p:nvSpPr>
+          <p:cNvPr id="209" name="Google Shape;209;p34"/>
+          <p:cNvSpPr/>
+          <p:nvPr/>
+        </p:nvSpPr>
+        <p:spPr>
+          <a:xfrm>
+            <a:off x="1" y="0"/>
+            <a:ext cx="3244200" cy="5143500"/>
+          </a:xfrm>
+          <a:prstGeom prst="rect">
+            <a:avLst/>
+          </a:prstGeom>
+          <a:solidFill>
+            <a:srgbClr val="B7402F"/>
+          </a:solidFill>
+          <a:ln>
+            <a:noFill/>
+          </a:ln>
+        </p:spPr>
+        <p:txBody>
+          <a:bodyPr anchorCtr="0" anchor="ctr" bIns="34275" lIns="68575" spcFirstLastPara="1" rIns="68575" wrap="square" tIns="34275">
+            <a:noAutofit/>
+          </a:bodyPr>
+          <a:lstStyle/>
+          <a:p>
+            <a:pPr indent="0" lvl="0" marL="0" marR="0" rtl="0" algn="ctr">
+              <a:spcBef>
+                <a:spcPts val="0"/>
+              </a:spcBef>
+              <a:spcAft>
+                <a:spcPts val="0"/>
+              </a:spcAft>
+              <a:buNone/>
+            </a:pPr>
+            <a:r>
+              <a:t/>
+            </a:r>
+            <a:endParaRPr b="1" sz="1400">
+              <a:solidFill>
+                <a:schemeClr val="lt1"/>
+              </a:solidFill>
+              <a:latin typeface="Calibri"/>
+              <a:ea typeface="Calibri"/>
+              <a:cs typeface="Calibri"/>
+              <a:sym typeface="Calibri"/>
+            </a:endParaRPr>
+          </a:p>
+        </p:txBody>
+      </p:sp>
+      <p:sp>
+        <p:nvSpPr>
+          <p:cNvPr id="210" name="Google Shape;210;p34"/>
+          <p:cNvSpPr txBox="1"/>
+          <p:nvPr/>
+        </p:nvSpPr>
+        <p:spPr>
+          <a:xfrm>
+            <a:off x="410918" y="1512059"/>
+            <a:ext cx="2256600" cy="992400"/>
+          </a:xfrm>
+          <a:prstGeom prst="rect">
+            <a:avLst/>
+          </a:prstGeom>
+          <a:noFill/>
+          <a:ln>
+            <a:noFill/>
+          </a:ln>
+        </p:spPr>
+        <p:txBody>
+          <a:bodyPr anchorCtr="0" anchor="t" bIns="34275" lIns="68575" spcFirstLastPara="1" rIns="68575" wrap="square" tIns="34275">
+            <a:noAutofit/>
+          </a:bodyPr>
+          <a:lstStyle/>
+          <a:p>
+            <a:pPr indent="0" lvl="0" marL="0" marR="0" rtl="0" algn="l">
+              <a:spcBef>
+                <a:spcPts val="0"/>
+              </a:spcBef>
+              <a:spcAft>
+                <a:spcPts val="0"/>
+              </a:spcAft>
+              <a:buNone/>
+            </a:pPr>
+            <a:r>
+              <a:rPr b="1" lang="id" sz="3000">
+                <a:solidFill>
+                  <a:schemeClr val="lt1"/>
+                </a:solidFill>
+                <a:latin typeface="Calibri"/>
+                <a:ea typeface="Calibri"/>
+                <a:cs typeface="Calibri"/>
+                <a:sym typeface="Calibri"/>
+              </a:rPr>
+              <a:t>RESULT AND </a:t>
+            </a:r>
+            <a:endParaRPr sz="1100"/>
+          </a:p>
+          <a:p>
+            <a:pPr indent="0" lvl="0" marL="0" marR="0" rtl="0" algn="l">
+              <a:spcBef>
+                <a:spcPts val="0"/>
+              </a:spcBef>
+              <a:spcAft>
+                <a:spcPts val="0"/>
+              </a:spcAft>
+              <a:buNone/>
+            </a:pPr>
+            <a:r>
+              <a:rPr b="1" lang="id" sz="3000">
+                <a:solidFill>
+                  <a:schemeClr val="lt1"/>
+                </a:solidFill>
+                <a:latin typeface="Calibri"/>
+                <a:ea typeface="Calibri"/>
+                <a:cs typeface="Calibri"/>
+                <a:sym typeface="Calibri"/>
+              </a:rPr>
+              <a:t>CONCLUSION</a:t>
+            </a:r>
+            <a:endParaRPr b="1" sz="3000">
+              <a:solidFill>
+                <a:schemeClr val="lt1"/>
+              </a:solidFill>
+              <a:latin typeface="Calibri"/>
+              <a:ea typeface="Calibri"/>
+              <a:cs typeface="Calibri"/>
+              <a:sym typeface="Calibri"/>
+            </a:endParaRPr>
+          </a:p>
+        </p:txBody>
+      </p:sp>
+      <p:sp>
+        <p:nvSpPr>
+          <p:cNvPr id="211" name="Google Shape;211;p34"/>
+          <p:cNvSpPr/>
+          <p:nvPr/>
+        </p:nvSpPr>
+        <p:spPr>
+          <a:xfrm>
+            <a:off x="3644500" y="558024"/>
+            <a:ext cx="4870800" cy="3808800"/>
+          </a:xfrm>
+          <a:prstGeom prst="rect">
+            <a:avLst/>
+          </a:prstGeom>
+          <a:noFill/>
+          <a:ln>
+            <a:noFill/>
+          </a:ln>
+        </p:spPr>
+        <p:txBody>
+          <a:bodyPr anchorCtr="0" anchor="t" bIns="34275" lIns="68575" spcFirstLastPara="1" rIns="68575" wrap="square" tIns="34275">
+            <a:noAutofit/>
+          </a:bodyPr>
+          <a:lstStyle/>
+          <a:p>
+            <a:pPr indent="0" lvl="0" marL="0" rtl="0" algn="l">
+              <a:lnSpc>
+                <a:spcPct val="115000"/>
+              </a:lnSpc>
+              <a:spcBef>
+                <a:spcPts val="0"/>
+              </a:spcBef>
+              <a:spcAft>
+                <a:spcPts val="0"/>
+              </a:spcAft>
+              <a:buClr>
+                <a:schemeClr val="dk1"/>
+              </a:buClr>
+              <a:buSzPts val="1100"/>
+              <a:buFont typeface="Arial"/>
+              <a:buNone/>
+            </a:pPr>
+            <a:r>
+              <a:rPr lang="id" sz="1800">
+                <a:solidFill>
+                  <a:schemeClr val="dk1"/>
+                </a:solidFill>
+                <a:latin typeface="Calibri"/>
+                <a:ea typeface="Calibri"/>
+                <a:cs typeface="Calibri"/>
+                <a:sym typeface="Calibri"/>
+              </a:rPr>
+              <a:t>Eventhough the MNIST has “only” 60,000 training images, each 28 by 28 grayscale pixels, and is divided into 10 classes (0, 1, 2, …, 9) </a:t>
+            </a:r>
+            <a:r>
+              <a:rPr b="1" lang="id" sz="1800">
+                <a:solidFill>
+                  <a:schemeClr val="dk1"/>
+                </a:solidFill>
+                <a:latin typeface="Calibri"/>
+                <a:ea typeface="Calibri"/>
+                <a:cs typeface="Calibri"/>
+                <a:sym typeface="Calibri"/>
+              </a:rPr>
+              <a:t>we can achive 98% accuracy </a:t>
+            </a:r>
+            <a:r>
+              <a:rPr lang="id" sz="1800">
+                <a:solidFill>
+                  <a:schemeClr val="dk1"/>
+                </a:solidFill>
+                <a:latin typeface="Calibri"/>
+                <a:ea typeface="Calibri"/>
+                <a:cs typeface="Calibri"/>
+                <a:sym typeface="Calibri"/>
+              </a:rPr>
+              <a:t>so that we achive our success metric. With the 98% accuracy we prove the h0 hypotesis. By comparison, modern image recognition systems may be trained on more than a million full-color, high-resolution images, with far more classes. This model is very simple but have a lot of application in real life such as OCR, document scanner using photo of handwritten, etc.</a:t>
+            </a:r>
+            <a:endParaRPr sz="1800">
+              <a:solidFill>
+                <a:schemeClr val="dk1"/>
+              </a:solidFill>
+              <a:latin typeface="Calibri"/>
+              <a:ea typeface="Calibri"/>
+              <a:cs typeface="Calibri"/>
+              <a:sym typeface="Calibri"/>
+            </a:endParaRPr>
+          </a:p>
+          <a:p>
+            <a:pPr indent="0" lvl="0" marL="0" marR="0" rtl="0" algn="l">
+              <a:spcBef>
+                <a:spcPts val="0"/>
+              </a:spcBef>
+              <a:spcAft>
+                <a:spcPts val="0"/>
+              </a:spcAft>
+              <a:buNone/>
+            </a:pPr>
+            <a:r>
+              <a:t/>
+            </a:r>
+            <a:endParaRPr sz="1800">
+              <a:solidFill>
+                <a:schemeClr val="dk1"/>
+              </a:solidFill>
+              <a:latin typeface="Calibri"/>
+              <a:ea typeface="Calibri"/>
+              <a:cs typeface="Calibri"/>
+              <a:sym typeface="Calibri"/>
+            </a:endParaRPr>
+          </a:p>
+        </p:txBody>
+      </p:sp>
+    </p:spTree>
+  </p:cSld>
+  <p:clrMapOvr>
+    <a:masterClrMapping/>
+  </p:clrMapOvr>
+</p:sld>
+</file>
+
 <file path=ppt/slides/slide2.xml><?xml version="1.0" encoding="utf-8"?>
 <p:sld xmlns:a="http://schemas.openxmlformats.org/drawingml/2006/main" xmlns:r="http://schemas.openxmlformats.org/officeDocument/2006/relationships" xmlns:mc="http://schemas.openxmlformats.org/markup-compatibility/2006" xmlns:mv="urn:schemas-microsoft-com:mac:vml" xmlns:p="http://schemas.openxmlformats.org/presentationml/2006/main" xmlns:c="http://schemas.openxmlformats.org/drawingml/2006/chart" xmlns:dgm="http://schemas.openxmlformats.org/drawingml/2006/diagram" xmlns:o="urn:schemas-microsoft-com:office:office" xmlns:v="urn:schemas-microsoft-com:vml" xmlns:pvml="urn:schemas-microsoft-com:office:powerpoint" xmlns:com="http://schemas.openxmlformats.org/drawingml/2006/compatibility" xmlns:p14="http://schemas.microsoft.com/office/powerpoint/2010/main" xmlns:p15="http://schemas.microsoft.com/office/powerpoint/2012/main">
   <p:cSld>
@@ -19592,8 +20063,8 @@
         </p:nvSpPr>
         <p:spPr>
           <a:xfrm>
-            <a:off x="410918" y="1512059"/>
-            <a:ext cx="2256600" cy="992400"/>
+            <a:off x="343827" y="1978250"/>
+            <a:ext cx="2949000" cy="531000"/>
           </a:xfrm>
           <a:prstGeom prst="rect">
             <a:avLst/>
@@ -19619,42 +20090,9 @@
               <a:buNone/>
             </a:pPr>
             <a:r>
-              <a:rPr b="1" lang="id" sz="3000">
-                <a:solidFill>
-                  <a:schemeClr val="lt1"/>
-                </a:solidFill>
-                <a:latin typeface="Calibri"/>
-                <a:ea typeface="Calibri"/>
-                <a:cs typeface="Calibri"/>
-                <a:sym typeface="Calibri"/>
-              </a:rPr>
-              <a:t>RESULT AND </a:t>
+              <a:t/>
             </a:r>
-            <a:endParaRPr sz="1100"/>
-          </a:p>
-          <a:p>
-            <a:pPr indent="0" lvl="0" marL="0" marR="0" rtl="0" algn="l">
-              <a:spcBef>
-                <a:spcPts val="0"/>
-              </a:spcBef>
-              <a:spcAft>
-                <a:spcPts val="0"/>
-              </a:spcAft>
-              <a:buNone/>
-            </a:pPr>
-            <a:r>
-              <a:rPr b="1" lang="id" sz="3000">
-                <a:solidFill>
-                  <a:schemeClr val="lt1"/>
-                </a:solidFill>
-                <a:latin typeface="Calibri"/>
-                <a:ea typeface="Calibri"/>
-                <a:cs typeface="Calibri"/>
-                <a:sym typeface="Calibri"/>
-              </a:rPr>
-              <a:t>CONCLUSION</a:t>
-            </a:r>
-            <a:endParaRPr b="1" sz="3000">
+            <a:endParaRPr b="1" sz="3600">
               <a:solidFill>
                 <a:schemeClr val="lt1"/>
               </a:solidFill>
@@ -19674,8 +20112,8 @@
         </p:nvSpPr>
         <p:spPr>
           <a:xfrm>
-            <a:off x="3644500" y="558024"/>
-            <a:ext cx="4870800" cy="3808800"/>
+            <a:off x="3569765" y="1140589"/>
+            <a:ext cx="4870800" cy="2862300"/>
           </a:xfrm>
           <a:prstGeom prst="rect">
             <a:avLst/>
@@ -19691,7 +20129,7 @@
           </a:bodyPr>
           <a:lstStyle/>
           <a:p>
-            <a:pPr indent="0" lvl="0" marL="0" rtl="0" algn="l">
+            <a:pPr indent="0" lvl="0" marL="0" rtl="0" algn="just">
               <a:lnSpc>
                 <a:spcPct val="115000"/>
               </a:lnSpc>
@@ -19718,7 +20156,7 @@
                 <a:cs typeface="Calibri"/>
                 <a:sym typeface="Calibri"/>
               </a:rPr>
-              <a:t>Eventhough the MNIST has “only” 60,000 training images, each 28 by 28 grayscale pixels, and is divided into 10 classes (0, 1, 2, …, 9) </a:t>
+              <a:t>•</a:t>
             </a:r>
             <a:r>
               <a:rPr b="1" lang="id" sz="1800">
@@ -19730,8 +20168,326 @@
                 <a:cs typeface="Calibri"/>
                 <a:sym typeface="Calibri"/>
               </a:rPr>
-              <a:t>we can achive 98% accuracy </a:t>
+              <a:t>We use architecture network as is of tensor flow tutorial:</a:t>
             </a:r>
+            <a:br>
+              <a:rPr b="1" lang="id" sz="1800">
+                <a:solidFill>
+                  <a:schemeClr val="dk1"/>
+                </a:solidFill>
+                <a:latin typeface="Calibri"/>
+                <a:ea typeface="Calibri"/>
+                <a:cs typeface="Calibri"/>
+                <a:sym typeface="Calibri"/>
+              </a:rPr>
+            </a:br>
+            <a:r>
+              <a:rPr b="1" lang="id" sz="1800">
+                <a:solidFill>
+                  <a:schemeClr val="dk1"/>
+                </a:solidFill>
+                <a:latin typeface="Calibri"/>
+                <a:ea typeface="Calibri"/>
+                <a:cs typeface="Calibri"/>
+                <a:sym typeface="Calibri"/>
+              </a:rPr>
+              <a:t>a. </a:t>
+            </a:r>
+            <a:r>
+              <a:rPr lang="id" sz="1800" u="sng">
+                <a:solidFill>
+                  <a:schemeClr val="hlink"/>
+                </a:solidFill>
+                <a:hlinkClick r:id="rId3"/>
+              </a:rPr>
+              <a:t>https://www.tensorflow.org/tutorials/quickstart/beginner</a:t>
+            </a:r>
+            <a:endParaRPr b="1" sz="1800">
+              <a:solidFill>
+                <a:schemeClr val="dk1"/>
+              </a:solidFill>
+              <a:latin typeface="Calibri"/>
+              <a:ea typeface="Calibri"/>
+              <a:cs typeface="Calibri"/>
+              <a:sym typeface="Calibri"/>
+            </a:endParaRPr>
+          </a:p>
+          <a:p>
+            <a:pPr indent="0" lvl="0" marL="0" rtl="0" algn="just">
+              <a:lnSpc>
+                <a:spcPct val="115000"/>
+              </a:lnSpc>
+              <a:spcBef>
+                <a:spcPts val="0"/>
+              </a:spcBef>
+              <a:spcAft>
+                <a:spcPts val="0"/>
+              </a:spcAft>
+              <a:buClr>
+                <a:schemeClr val="dk1"/>
+              </a:buClr>
+              <a:buSzPts val="1100"/>
+              <a:buFont typeface="Arial"/>
+              <a:buNone/>
+            </a:pPr>
+            <a:r>
+              <a:rPr b="1" lang="id" sz="1800">
+                <a:solidFill>
+                  <a:schemeClr val="dk1"/>
+                </a:solidFill>
+                <a:latin typeface="Calibri"/>
+                <a:ea typeface="Calibri"/>
+                <a:cs typeface="Calibri"/>
+                <a:sym typeface="Calibri"/>
+              </a:rPr>
+              <a:t>b. </a:t>
+            </a:r>
+            <a:r>
+              <a:rPr lang="id" sz="1800" u="sng">
+                <a:solidFill>
+                  <a:schemeClr val="hlink"/>
+                </a:solidFill>
+                <a:hlinkClick r:id="rId4"/>
+              </a:rPr>
+              <a:t>https://www.tensorflow.org/tutorials/quickstart/advanced</a:t>
+            </a:r>
+            <a:endParaRPr b="1" sz="1800">
+              <a:solidFill>
+                <a:schemeClr val="dk1"/>
+              </a:solidFill>
+              <a:latin typeface="Calibri"/>
+              <a:ea typeface="Calibri"/>
+              <a:cs typeface="Calibri"/>
+              <a:sym typeface="Calibri"/>
+            </a:endParaRPr>
+          </a:p>
+        </p:txBody>
+      </p:sp>
+      <p:sp>
+        <p:nvSpPr>
+          <p:cNvPr id="195" name="Google Shape;195;p32"/>
+          <p:cNvSpPr txBox="1"/>
+          <p:nvPr/>
+        </p:nvSpPr>
+        <p:spPr>
+          <a:xfrm>
+            <a:off x="72275" y="1192500"/>
+            <a:ext cx="3000000" cy="3000000"/>
+          </a:xfrm>
+          <a:prstGeom prst="rect">
+            <a:avLst/>
+          </a:prstGeom>
+          <a:noFill/>
+          <a:ln>
+            <a:noFill/>
+          </a:ln>
+        </p:spPr>
+        <p:txBody>
+          <a:bodyPr anchorCtr="0" anchor="t" bIns="91425" lIns="91425" spcFirstLastPara="1" rIns="91425" wrap="square" tIns="91425">
+            <a:noAutofit/>
+          </a:bodyPr>
+          <a:lstStyle/>
+          <a:p>
+            <a:pPr indent="0" lvl="0" marL="0" rtl="0" algn="l">
+              <a:spcBef>
+                <a:spcPts val="0"/>
+              </a:spcBef>
+              <a:spcAft>
+                <a:spcPts val="0"/>
+              </a:spcAft>
+              <a:buNone/>
+            </a:pPr>
+            <a:r>
+              <a:rPr b="1" lang="id" sz="3600">
+                <a:solidFill>
+                  <a:schemeClr val="lt1"/>
+                </a:solidFill>
+                <a:latin typeface="Calibri"/>
+                <a:ea typeface="Calibri"/>
+                <a:cs typeface="Calibri"/>
+                <a:sym typeface="Calibri"/>
+              </a:rPr>
+              <a:t>TESTING &amp; EVALUATION</a:t>
+            </a:r>
+            <a:endParaRPr b="1" sz="3600">
+              <a:solidFill>
+                <a:schemeClr val="lt1"/>
+              </a:solidFill>
+              <a:latin typeface="Calibri"/>
+              <a:ea typeface="Calibri"/>
+              <a:cs typeface="Calibri"/>
+              <a:sym typeface="Calibri"/>
+            </a:endParaRPr>
+          </a:p>
+        </p:txBody>
+      </p:sp>
+    </p:spTree>
+  </p:cSld>
+  <p:clrMapOvr>
+    <a:masterClrMapping/>
+  </p:clrMapOvr>
+</p:sld>
+</file>
+
+<file path=ppt/slides/slide9.xml><?xml version="1.0" encoding="utf-8"?>
+<p:sld xmlns:a="http://schemas.openxmlformats.org/drawingml/2006/main" xmlns:r="http://schemas.openxmlformats.org/officeDocument/2006/relationships" xmlns:mc="http://schemas.openxmlformats.org/markup-compatibility/2006" xmlns:mv="urn:schemas-microsoft-com:mac:vml" xmlns:p="http://schemas.openxmlformats.org/presentationml/2006/main" xmlns:c="http://schemas.openxmlformats.org/drawingml/2006/chart" xmlns:dgm="http://schemas.openxmlformats.org/drawingml/2006/diagram" xmlns:o="urn:schemas-microsoft-com:office:office" xmlns:v="urn:schemas-microsoft-com:vml" xmlns:pvml="urn:schemas-microsoft-com:office:powerpoint" xmlns:com="http://schemas.openxmlformats.org/drawingml/2006/compatibility" xmlns:p14="http://schemas.microsoft.com/office/powerpoint/2010/main" xmlns:p15="http://schemas.microsoft.com/office/powerpoint/2012/main">
+  <p:cSld>
+    <p:spTree>
+      <p:nvGrpSpPr>
+        <p:cNvPr id="199" name="Shape 199"/>
+        <p:cNvGrpSpPr/>
+        <p:nvPr/>
+      </p:nvGrpSpPr>
+      <p:grpSpPr>
+        <a:xfrm>
+          <a:off x="0" y="0"/>
+          <a:ext cx="0" cy="0"/>
+          <a:chOff x="0" y="0"/>
+          <a:chExt cx="0" cy="0"/>
+        </a:xfrm>
+      </p:grpSpPr>
+      <p:sp>
+        <p:nvSpPr>
+          <p:cNvPr id="200" name="Google Shape;200;p33"/>
+          <p:cNvSpPr/>
+          <p:nvPr/>
+        </p:nvSpPr>
+        <p:spPr>
+          <a:xfrm>
+            <a:off x="1" y="0"/>
+            <a:ext cx="3244200" cy="5143500"/>
+          </a:xfrm>
+          <a:prstGeom prst="rect">
+            <a:avLst/>
+          </a:prstGeom>
+          <a:solidFill>
+            <a:srgbClr val="B7402F"/>
+          </a:solidFill>
+          <a:ln>
+            <a:noFill/>
+          </a:ln>
+        </p:spPr>
+        <p:txBody>
+          <a:bodyPr anchorCtr="0" anchor="ctr" bIns="34275" lIns="68575" spcFirstLastPara="1" rIns="68575" wrap="square" tIns="34275">
+            <a:noAutofit/>
+          </a:bodyPr>
+          <a:lstStyle/>
+          <a:p>
+            <a:pPr indent="0" lvl="0" marL="0" marR="0" rtl="0" algn="ctr">
+              <a:spcBef>
+                <a:spcPts val="0"/>
+              </a:spcBef>
+              <a:spcAft>
+                <a:spcPts val="0"/>
+              </a:spcAft>
+              <a:buNone/>
+            </a:pPr>
+            <a:r>
+              <a:t/>
+            </a:r>
+            <a:endParaRPr b="1" sz="1400">
+              <a:solidFill>
+                <a:schemeClr val="lt1"/>
+              </a:solidFill>
+              <a:latin typeface="Calibri"/>
+              <a:ea typeface="Calibri"/>
+              <a:cs typeface="Calibri"/>
+              <a:sym typeface="Calibri"/>
+            </a:endParaRPr>
+          </a:p>
+        </p:txBody>
+      </p:sp>
+      <p:sp>
+        <p:nvSpPr>
+          <p:cNvPr id="201" name="Google Shape;201;p33"/>
+          <p:cNvSpPr txBox="1"/>
+          <p:nvPr/>
+        </p:nvSpPr>
+        <p:spPr>
+          <a:xfrm>
+            <a:off x="343827" y="1978250"/>
+            <a:ext cx="2949000" cy="531000"/>
+          </a:xfrm>
+          <a:prstGeom prst="rect">
+            <a:avLst/>
+          </a:prstGeom>
+          <a:noFill/>
+          <a:ln>
+            <a:noFill/>
+          </a:ln>
+        </p:spPr>
+        <p:txBody>
+          <a:bodyPr anchorCtr="0" anchor="t" bIns="34275" lIns="68575" spcFirstLastPara="1" rIns="68575" wrap="square" tIns="34275">
+            <a:noAutofit/>
+          </a:bodyPr>
+          <a:lstStyle/>
+          <a:p>
+            <a:pPr indent="0" lvl="0" marL="0" marR="0" rtl="0" algn="l">
+              <a:spcBef>
+                <a:spcPts val="0"/>
+              </a:spcBef>
+              <a:spcAft>
+                <a:spcPts val="0"/>
+              </a:spcAft>
+              <a:buNone/>
+            </a:pPr>
+            <a:r>
+              <a:t/>
+            </a:r>
+            <a:endParaRPr b="1" sz="3600">
+              <a:solidFill>
+                <a:schemeClr val="lt1"/>
+              </a:solidFill>
+              <a:latin typeface="Calibri"/>
+              <a:ea typeface="Calibri"/>
+              <a:cs typeface="Calibri"/>
+              <a:sym typeface="Calibri"/>
+            </a:endParaRPr>
+          </a:p>
+        </p:txBody>
+      </p:sp>
+      <p:sp>
+        <p:nvSpPr>
+          <p:cNvPr id="202" name="Google Shape;202;p33"/>
+          <p:cNvSpPr/>
+          <p:nvPr/>
+        </p:nvSpPr>
+        <p:spPr>
+          <a:xfrm>
+            <a:off x="3569775" y="1140592"/>
+            <a:ext cx="4870800" cy="837600"/>
+          </a:xfrm>
+          <a:prstGeom prst="rect">
+            <a:avLst/>
+          </a:prstGeom>
+          <a:noFill/>
+          <a:ln>
+            <a:noFill/>
+          </a:ln>
+        </p:spPr>
+        <p:txBody>
+          <a:bodyPr anchorCtr="0" anchor="t" bIns="34275" lIns="68575" spcFirstLastPara="1" rIns="68575" wrap="square" tIns="34275">
+            <a:noAutofit/>
+          </a:bodyPr>
+          <a:lstStyle/>
+          <a:p>
+            <a:pPr indent="0" lvl="0" marL="0" rtl="0" algn="just">
+              <a:lnSpc>
+                <a:spcPct val="115000"/>
+              </a:lnSpc>
+              <a:spcBef>
+                <a:spcPts val="0"/>
+              </a:spcBef>
+              <a:spcAft>
+                <a:spcPts val="0"/>
+              </a:spcAft>
+              <a:buClr>
+                <a:schemeClr val="dk1"/>
+              </a:buClr>
+              <a:buSzPts val="1100"/>
+              <a:buFont typeface="Arial"/>
+              <a:buNone/>
+            </a:pPr>
             <a:r>
               <a:rPr lang="id" sz="1800">
                 <a:solidFill>
@@ -19742,7 +20498,7 @@
                 <a:cs typeface="Calibri"/>
                 <a:sym typeface="Calibri"/>
               </a:rPr>
-              <a:t>so that we achive our success metric. With the 98% accuracy we prove the h0 hypotesis. By comparison, modern image recognition systems may be trained on more than a million full-color, high-resolution images, with far more classes. This model is very simple but have a lot of application in real life such as OCR, document scanner using photo of handwritten, etc.</a:t>
+              <a:t>After some training with different epoch, we get result:</a:t>
             </a:r>
             <a:endParaRPr sz="1800">
               <a:solidFill>
@@ -19755,13 +20511,52 @@
             </a:endParaRPr>
           </a:p>
           <a:p>
-            <a:pPr indent="0" lvl="0" marL="0" marR="0" rtl="0" algn="l">
-              <a:spcBef>
-                <a:spcPts val="0"/>
-              </a:spcBef>
-              <a:spcAft>
-                <a:spcPts val="0"/>
-              </a:spcAft>
+            <a:pPr indent="0" lvl="0" marL="0" rtl="0" algn="just">
+              <a:lnSpc>
+                <a:spcPct val="115000"/>
+              </a:lnSpc>
+              <a:spcBef>
+                <a:spcPts val="0"/>
+              </a:spcBef>
+              <a:spcAft>
+                <a:spcPts val="0"/>
+              </a:spcAft>
+              <a:buClr>
+                <a:schemeClr val="dk1"/>
+              </a:buClr>
+              <a:buSzPts val="1100"/>
+              <a:buFont typeface="Arial"/>
+              <a:buNone/>
+            </a:pPr>
+            <a:r>
+              <a:t/>
+            </a:r>
+            <a:endParaRPr sz="1800">
+              <a:solidFill>
+                <a:schemeClr val="dk1"/>
+              </a:solidFill>
+              <a:latin typeface="Calibri"/>
+              <a:ea typeface="Calibri"/>
+              <a:cs typeface="Calibri"/>
+              <a:sym typeface="Calibri"/>
+            </a:endParaRPr>
+          </a:p>
+          <a:p>
+            <a:pPr indent="0" lvl="0" marL="0" rtl="0" algn="just">
+              <a:lnSpc>
+                <a:spcPct val="115000"/>
+              </a:lnSpc>
+              <a:spcBef>
+                <a:spcPts val="0"/>
+              </a:spcBef>
+              <a:spcAft>
+                <a:spcPts val="0"/>
+              </a:spcAft>
+              <a:buClr>
+                <a:schemeClr val="dk1"/>
+              </a:buClr>
+              <a:buSzPts val="1100"/>
+              <a:buFont typeface="Arial"/>
               <a:buNone/>
             </a:pPr>
             <a:r>
@@ -19779,6 +20574,391 @@
           </a:p>
         </p:txBody>
       </p:sp>
+      <p:sp>
+        <p:nvSpPr>
+          <p:cNvPr id="203" name="Google Shape;203;p33"/>
+          <p:cNvSpPr txBox="1"/>
+          <p:nvPr/>
+        </p:nvSpPr>
+        <p:spPr>
+          <a:xfrm>
+            <a:off x="72275" y="1192500"/>
+            <a:ext cx="3000000" cy="3000000"/>
+          </a:xfrm>
+          <a:prstGeom prst="rect">
+            <a:avLst/>
+          </a:prstGeom>
+          <a:noFill/>
+          <a:ln>
+            <a:noFill/>
+          </a:ln>
+        </p:spPr>
+        <p:txBody>
+          <a:bodyPr anchorCtr="0" anchor="t" bIns="91425" lIns="91425" spcFirstLastPara="1" rIns="91425" wrap="square" tIns="91425">
+            <a:noAutofit/>
+          </a:bodyPr>
+          <a:lstStyle/>
+          <a:p>
+            <a:pPr indent="0" lvl="0" marL="0" rtl="0" algn="l">
+              <a:spcBef>
+                <a:spcPts val="0"/>
+              </a:spcBef>
+              <a:spcAft>
+                <a:spcPts val="0"/>
+              </a:spcAft>
+              <a:buNone/>
+            </a:pPr>
+            <a:r>
+              <a:rPr b="1" lang="id" sz="3600">
+                <a:solidFill>
+                  <a:schemeClr val="lt1"/>
+                </a:solidFill>
+                <a:latin typeface="Calibri"/>
+                <a:ea typeface="Calibri"/>
+                <a:cs typeface="Calibri"/>
+                <a:sym typeface="Calibri"/>
+              </a:rPr>
+              <a:t>TESTING &amp; EVALUATION</a:t>
+            </a:r>
+            <a:endParaRPr b="1" sz="3600">
+              <a:solidFill>
+                <a:schemeClr val="lt1"/>
+              </a:solidFill>
+              <a:latin typeface="Calibri"/>
+              <a:ea typeface="Calibri"/>
+              <a:cs typeface="Calibri"/>
+              <a:sym typeface="Calibri"/>
+            </a:endParaRPr>
+          </a:p>
+        </p:txBody>
+      </p:sp>
+      <p:graphicFrame>
+        <p:nvGraphicFramePr>
+          <p:cNvPr id="204" name="Google Shape;204;p33"/>
+          <p:cNvGraphicFramePr/>
+          <p:nvPr/>
+        </p:nvGraphicFramePr>
+        <p:xfrm>
+          <a:off x="3656750" y="1902375"/>
+          <a:ext cx="3000000" cy="3000000"/>
+        </p:xfrm>
+        <a:graphic>
+          <a:graphicData uri="http://schemas.openxmlformats.org/drawingml/2006/table">
+            <a:tbl>
+              <a:tblPr>
+                <a:noFill/>
+                <a:tableStyleId>{308F1CE1-D2B7-4FE0-8B7F-7E46D8DE5757}</a:tableStyleId>
+              </a:tblPr>
+              <a:tblGrid>
+                <a:gridCol w="2267375"/>
+                <a:gridCol w="2267375"/>
+              </a:tblGrid>
+              <a:tr h="500000">
+                <a:tc>
+                  <a:txBody>
+                    <a:bodyPr/>
+                    <a:lstStyle/>
+                    <a:p>
+                      <a:pPr indent="0" lvl="0" marL="0" rtl="0" algn="l">
+                        <a:spcBef>
+                          <a:spcPts val="0"/>
+                        </a:spcBef>
+                        <a:spcAft>
+                          <a:spcPts val="0"/>
+                        </a:spcAft>
+                        <a:buNone/>
+                      </a:pPr>
+                      <a:r>
+                        <a:rPr b="1" lang="id"/>
+                        <a:t>Epoch</a:t>
+                      </a:r>
+                      <a:endParaRPr b="1"/>
+                    </a:p>
+                  </a:txBody>
+                  <a:tcPr marT="91425" marB="91425" marR="91425" marL="91425"/>
+                </a:tc>
+                <a:tc>
+                  <a:txBody>
+                    <a:bodyPr/>
+                    <a:lstStyle/>
+                    <a:p>
+                      <a:pPr indent="0" lvl="0" marL="0" rtl="0" algn="l">
+                        <a:spcBef>
+                          <a:spcPts val="0"/>
+                        </a:spcBef>
+                        <a:spcAft>
+                          <a:spcPts val="0"/>
+                        </a:spcAft>
+                        <a:buNone/>
+                      </a:pPr>
+                      <a:r>
+                        <a:rPr b="1" lang="id"/>
+                        <a:t>Accuracy (%)</a:t>
+                      </a:r>
+                      <a:endParaRPr b="1"/>
+                    </a:p>
+                  </a:txBody>
+                  <a:tcPr marT="91425" marB="91425" marR="91425" marL="91425"/>
+                </a:tc>
+              </a:tr>
+              <a:tr h="500000">
+                <a:tc>
+                  <a:txBody>
+                    <a:bodyPr/>
+                    <a:lstStyle/>
+                    <a:p>
+                      <a:pPr indent="0" lvl="0" marL="0" rtl="0" algn="l">
+                        <a:spcBef>
+                          <a:spcPts val="0"/>
+                        </a:spcBef>
+                        <a:spcAft>
+                          <a:spcPts val="0"/>
+                        </a:spcAft>
+                        <a:buNone/>
+                      </a:pPr>
+                      <a:r>
+                        <a:rPr lang="id"/>
+                        <a:t>5</a:t>
+                      </a:r>
+                      <a:endParaRPr/>
+                    </a:p>
+                  </a:txBody>
+                  <a:tcPr marT="91425" marB="91425" marR="91425" marL="91425"/>
+                </a:tc>
+                <a:tc>
+                  <a:txBody>
+                    <a:bodyPr/>
+                    <a:lstStyle/>
+                    <a:p>
+                      <a:pPr indent="0" lvl="0" marL="0" rtl="0" algn="l">
+                        <a:spcBef>
+                          <a:spcPts val="0"/>
+                        </a:spcBef>
+                        <a:spcAft>
+                          <a:spcPts val="0"/>
+                        </a:spcAft>
+                        <a:buNone/>
+                      </a:pPr>
+                      <a:r>
+                        <a:rPr lang="id" sz="1150">
+                          <a:solidFill>
+                            <a:srgbClr val="212121"/>
+                          </a:solidFill>
+                          <a:highlight>
+                            <a:srgbClr val="FFFFFF"/>
+                          </a:highlight>
+                        </a:rPr>
+                        <a:t>97.68</a:t>
+                      </a:r>
+                      <a:endParaRPr/>
+                    </a:p>
+                  </a:txBody>
+                  <a:tcPr marT="91425" marB="91425" marR="91425" marL="91425"/>
+                </a:tc>
+              </a:tr>
+              <a:tr h="500000">
+                <a:tc>
+                  <a:txBody>
+                    <a:bodyPr/>
+                    <a:lstStyle/>
+                    <a:p>
+                      <a:pPr indent="0" lvl="0" marL="0" rtl="0" algn="l">
+                        <a:spcBef>
+                          <a:spcPts val="0"/>
+                        </a:spcBef>
+                        <a:spcAft>
+                          <a:spcPts val="0"/>
+                        </a:spcAft>
+                        <a:buNone/>
+                      </a:pPr>
+                      <a:r>
+                        <a:rPr lang="id"/>
+                        <a:t>10</a:t>
+                      </a:r>
+                      <a:endParaRPr/>
+                    </a:p>
+                  </a:txBody>
+                  <a:tcPr marT="91425" marB="91425" marR="91425" marL="91425"/>
+                </a:tc>
+                <a:tc>
+                  <a:txBody>
+                    <a:bodyPr/>
+                    <a:lstStyle/>
+                    <a:p>
+                      <a:pPr indent="0" lvl="0" marL="0" rtl="0" algn="l">
+                        <a:spcBef>
+                          <a:spcPts val="0"/>
+                        </a:spcBef>
+                        <a:spcAft>
+                          <a:spcPts val="0"/>
+                        </a:spcAft>
+                        <a:buNone/>
+                      </a:pPr>
+                      <a:r>
+                        <a:rPr lang="id" sz="1150">
+                          <a:solidFill>
+                            <a:srgbClr val="212121"/>
+                          </a:solidFill>
+                          <a:highlight>
+                            <a:srgbClr val="FFFFFF"/>
+                          </a:highlight>
+                        </a:rPr>
+                        <a:t>98.06</a:t>
+                      </a:r>
+                      <a:endParaRPr/>
+                    </a:p>
+                  </a:txBody>
+                  <a:tcPr marT="91425" marB="91425" marR="91425" marL="91425"/>
+                </a:tc>
+              </a:tr>
+              <a:tr h="500000">
+                <a:tc>
+                  <a:txBody>
+                    <a:bodyPr/>
+                    <a:lstStyle/>
+                    <a:p>
+                      <a:pPr indent="0" lvl="0" marL="0" rtl="0" algn="l">
+                        <a:spcBef>
+                          <a:spcPts val="0"/>
+                        </a:spcBef>
+                        <a:spcAft>
+                          <a:spcPts val="0"/>
+                        </a:spcAft>
+                        <a:buNone/>
+                      </a:pPr>
+                      <a:r>
+                        <a:rPr lang="id"/>
+                        <a:t>20</a:t>
+                      </a:r>
+                      <a:endParaRPr/>
+                    </a:p>
+                  </a:txBody>
+                  <a:tcPr marT="91425" marB="91425" marR="91425" marL="91425"/>
+                </a:tc>
+                <a:tc>
+                  <a:txBody>
+                    <a:bodyPr/>
+                    <a:lstStyle/>
+                    <a:p>
+                      <a:pPr indent="0" lvl="0" marL="0" rtl="0" algn="l">
+                        <a:spcBef>
+                          <a:spcPts val="0"/>
+                        </a:spcBef>
+                        <a:spcAft>
+                          <a:spcPts val="0"/>
+                        </a:spcAft>
+                        <a:buNone/>
+                      </a:pPr>
+                      <a:r>
+                        <a:rPr lang="id"/>
+                        <a:t>98.15</a:t>
+                      </a:r>
+                      <a:endParaRPr/>
+                    </a:p>
+                  </a:txBody>
+                  <a:tcPr marT="91425" marB="91425" marR="91425" marL="91425"/>
+                </a:tc>
+              </a:tr>
+              <a:tr h="500000">
+                <a:tc>
+                  <a:txBody>
+                    <a:bodyPr/>
+                    <a:lstStyle/>
+                    <a:p>
+                      <a:pPr indent="0" lvl="0" marL="0" rtl="0" algn="l">
+                        <a:spcBef>
+                          <a:spcPts val="0"/>
+                        </a:spcBef>
+                        <a:spcAft>
+                          <a:spcPts val="0"/>
+                        </a:spcAft>
+                        <a:buNone/>
+                      </a:pPr>
+                      <a:r>
+                        <a:rPr lang="id"/>
+                        <a:t>40</a:t>
+                      </a:r>
+                      <a:endParaRPr/>
+                    </a:p>
+                  </a:txBody>
+                  <a:tcPr marT="91425" marB="91425" marR="91425" marL="91425"/>
+                </a:tc>
+                <a:tc>
+                  <a:txBody>
+                    <a:bodyPr/>
+                    <a:lstStyle/>
+                    <a:p>
+                      <a:pPr indent="0" lvl="0" marL="0" rtl="0" algn="l">
+                        <a:spcBef>
+                          <a:spcPts val="0"/>
+                        </a:spcBef>
+                        <a:spcAft>
+                          <a:spcPts val="0"/>
+                        </a:spcAft>
+                        <a:buNone/>
+                      </a:pPr>
+                      <a:r>
+                        <a:rPr lang="id"/>
+                        <a:t>98.05</a:t>
+                      </a:r>
+                      <a:endParaRPr/>
+                    </a:p>
+                  </a:txBody>
+                  <a:tcPr marT="91425" marB="91425" marR="91425" marL="91425"/>
+                </a:tc>
+              </a:tr>
+              <a:tr h="500000">
+                <a:tc>
+                  <a:txBody>
+                    <a:bodyPr/>
+                    <a:lstStyle/>
+                    <a:p>
+                      <a:pPr indent="0" lvl="0" marL="0" rtl="0" algn="l">
+                        <a:spcBef>
+                          <a:spcPts val="0"/>
+                        </a:spcBef>
+                        <a:spcAft>
+                          <a:spcPts val="0"/>
+                        </a:spcAft>
+                        <a:buNone/>
+                      </a:pPr>
+                      <a:r>
+                        <a:rPr lang="id"/>
+                        <a:t>80</a:t>
+                      </a:r>
+                      <a:endParaRPr/>
+                    </a:p>
+                  </a:txBody>
+                  <a:tcPr marT="91425" marB="91425" marR="91425" marL="91425"/>
+                </a:tc>
+                <a:tc>
+                  <a:txBody>
+                    <a:bodyPr/>
+                    <a:lstStyle/>
+                    <a:p>
+                      <a:pPr indent="0" lvl="0" marL="0" rtl="0" algn="l">
+                        <a:spcBef>
+                          <a:spcPts val="0"/>
+                        </a:spcBef>
+                        <a:spcAft>
+                          <a:spcPts val="0"/>
+                        </a:spcAft>
+                        <a:buNone/>
+                      </a:pPr>
+                      <a:r>
+                        <a:rPr lang="id"/>
+                        <a:t>98.06</a:t>
+                      </a:r>
+                      <a:endParaRPr/>
+                    </a:p>
+                  </a:txBody>
+                  <a:tcPr marT="91425" marB="91425" marR="91425" marL="91425"/>
+                </a:tc>
+              </a:tr>
+            </a:tbl>
+          </a:graphicData>
+        </a:graphic>
+      </p:graphicFrame>
     </p:spTree>
   </p:cSld>
   <p:clrMapOvr>
@@ -20067,6 +21247,285 @@
 </file>
 
 <file path=ppt/theme/theme2.xml><?xml version="1.0" encoding="utf-8"?>
+<a:theme xmlns:a="http://schemas.openxmlformats.org/drawingml/2006/main" xmlns:r="http://schemas.openxmlformats.org/officeDocument/2006/relationships" name="Office Theme">
+  <a:themeElements>
+    <a:clrScheme name="Office">
+      <a:dk1>
+        <a:srgbClr val="000000"/>
+      </a:dk1>
+      <a:lt1>
+        <a:srgbClr val="FFFFFF"/>
+      </a:lt1>
+      <a:dk2>
+        <a:srgbClr val="44546A"/>
+      </a:dk2>
+      <a:lt2>
+        <a:srgbClr val="E7E6E6"/>
+      </a:lt2>
+      <a:accent1>
+        <a:srgbClr val="4472C4"/>
+      </a:accent1>
+      <a:accent2>
+        <a:srgbClr val="ED7D31"/>
+      </a:accent2>
+      <a:accent3>
+        <a:srgbClr val="A5A5A5"/>
+      </a:accent3>
+      <a:accent4>
+        <a:srgbClr val="FFC000"/>
+      </a:accent4>
+      <a:accent5>
+        <a:srgbClr val="5B9BD5"/>
+      </a:accent5>
+      <a:accent6>
+        <a:srgbClr val="70AD47"/>
+      </a:accent6>
+      <a:hlink>
+        <a:srgbClr val="0563C1"/>
+      </a:hlink>
+      <a:folHlink>
+        <a:srgbClr val="954F72"/>
+      </a:folHlink>
+    </a:clrScheme>
+    <a:fontScheme name="Office">
+      <a:majorFont>
+        <a:latin typeface="Arial"/>
+        <a:ea typeface=""/>
+        <a:cs typeface=""/>
+        <a:font script="Jpan" typeface="ＭＳ Ｐゴシック"/>
+        <a:font script="Hang" typeface="맑은 고딕"/>
+        <a:font script="Hans" typeface="宋体"/>
+        <a:font script="Hant" typeface="新細明體"/>
+        <a:font script="Arab" typeface="Times New Roman"/>
+        <a:font script="Hebr" typeface="Times New Roman"/>
+        <a:font script="Thai" typeface="Angsana New"/>
+        <a:font script="Ethi" typeface="Nyala"/>
+        <a:font script="Beng" typeface="Vrinda"/>
+        <a:font script="Gujr" typeface="Shruti"/>
+        <a:font script="Khmr" typeface="MoolBoran"/>
+        <a:font script="Knda" typeface="Tunga"/>
+        <a:font script="Guru" typeface="Raavi"/>
+        <a:font script="Cans" typeface="Euphemia"/>
+        <a:font script="Cher" typeface="Plantagenet Cherokee"/>
+        <a:font script="Yiii" typeface="Microsoft Yi Baiti"/>
+        <a:font script="Tibt" typeface="Microsoft Himalaya"/>
+        <a:font script="Thaa" typeface="MV Boli"/>
+        <a:font script="Deva" typeface="Mangal"/>
+        <a:font script="Telu" typeface="Gautami"/>
+        <a:font script="Taml" typeface="Latha"/>
+        <a:font script="Syrc" typeface="Estrangelo Edessa"/>
+        <a:font script="Orya" typeface="Kalinga"/>
+        <a:font script="Mlym" typeface="Kartika"/>
+        <a:font script="Laoo" typeface="DokChampa"/>
+        <a:font script="Sinh" typeface="Iskoola Pota"/>
+        <a:font script="Mong" typeface="Mongolian Baiti"/>
+        <a:font script="Viet" typeface="Times New Roman"/>
+        <a:font script="Uigh" typeface="Microsoft Uighur"/>
+        <a:font script="Geor" typeface="Sylfaen"/>
+      </a:majorFont>
+      <a:minorFont>
+        <a:latin typeface="Arial"/>
+        <a:ea typeface=""/>
+        <a:cs typeface=""/>
+        <a:font script="Jpan" typeface="ＭＳ Ｐゴシック"/>
+        <a:font script="Hang" typeface="맑은 고딕"/>
+        <a:font script="Hans" typeface="宋体"/>
+        <a:font script="Hant" typeface="新細明體"/>
+        <a:font script="Arab" typeface="Arial"/>
+        <a:font script="Hebr" typeface="Arial"/>
+        <a:font script="Thai" typeface="Cordia New"/>
+        <a:font script="Ethi" typeface="Nyala"/>
+        <a:font script="Beng" typeface="Vrinda"/>
+        <a:font script="Gujr" typeface="Shruti"/>
+        <a:font script="Khmr" typeface="DaunPenh"/>
+        <a:font script="Knda" typeface="Tunga"/>
+        <a:font script="Guru" typeface="Raavi"/>
+        <a:font script="Cans" typeface="Euphemia"/>
+        <a:font script="Cher" typeface="Plantagenet Cherokee"/>
+        <a:font script="Yiii" typeface="Microsoft Yi Baiti"/>
+        <a:font script="Tibt" typeface="Microsoft Himalaya"/>
+        <a:font script="Thaa" typeface="MV Boli"/>
+        <a:font script="Deva" typeface="Mangal"/>
+        <a:font script="Telu" typeface="Gautami"/>
+        <a:font script="Taml" typeface="Latha"/>
+        <a:font script="Syrc" typeface="Estrangelo Edessa"/>
+        <a:font script="Orya" typeface="Kalinga"/>
+        <a:font script="Mlym" typeface="Kartika"/>
+        <a:font script="Laoo" typeface="DokChampa"/>
+        <a:font script="Sinh" typeface="Iskoola Pota"/>
+        <a:font script="Mong" typeface="Mongolian Baiti"/>
+        <a:font script="Viet" typeface="Arial"/>
+        <a:font script="Uigh" typeface="Microsoft Uighur"/>
+        <a:font script="Geor" typeface="Sylfaen"/>
+      </a:minorFont>
+    </a:fontScheme>
+    <a:fmtScheme name="Office">
+      <a:fillStyleLst>
+        <a:solidFill>
+          <a:schemeClr val="phClr"/>
+        </a:solidFill>
+        <a:gradFill rotWithShape="1">
+          <a:gsLst>
+            <a:gs pos="0">
+              <a:schemeClr val="phClr">
+                <a:tint val="50000"/>
+                <a:satMod val="300000"/>
+              </a:schemeClr>
+            </a:gs>
+            <a:gs pos="35000">
+              <a:schemeClr val="phClr">
+                <a:tint val="37000"/>
+                <a:satMod val="300000"/>
+              </a:schemeClr>
+            </a:gs>
+            <a:gs pos="100000">
+              <a:schemeClr val="phClr">
+                <a:tint val="15000"/>
+                <a:satMod val="350000"/>
+              </a:schemeClr>
+            </a:gs>
+          </a:gsLst>
+          <a:lin ang="16200000" scaled="1"/>
+        </a:gradFill>
+        <a:gradFill rotWithShape="1">
+          <a:gsLst>
+            <a:gs pos="0">
+              <a:schemeClr val="phClr">
+                <a:tint val="100000"/>
+                <a:shade val="100000"/>
+                <a:satMod val="130000"/>
+              </a:schemeClr>
+            </a:gs>
+            <a:gs pos="100000">
+              <a:schemeClr val="phClr">
+                <a:tint val="50000"/>
+                <a:shade val="100000"/>
+                <a:satMod val="350000"/>
+              </a:schemeClr>
+            </a:gs>
+          </a:gsLst>
+          <a:lin ang="16200000" scaled="0"/>
+        </a:gradFill>
+      </a:fillStyleLst>
+      <a:lnStyleLst>
+        <a:ln w="9525" cap="flat" cmpd="sng" algn="ctr">
+          <a:solidFill>
+            <a:schemeClr val="phClr">
+              <a:shade val="95000"/>
+              <a:satMod val="105000"/>
+            </a:schemeClr>
+          </a:solidFill>
+          <a:prstDash val="solid"/>
+        </a:ln>
+        <a:ln w="25400" cap="flat" cmpd="sng" algn="ctr">
+          <a:solidFill>
+            <a:schemeClr val="phClr"/>
+          </a:solidFill>
+          <a:prstDash val="solid"/>
+        </a:ln>
+        <a:ln w="38100" cap="flat" cmpd="sng" algn="ctr">
+          <a:solidFill>
+            <a:schemeClr val="phClr"/>
+          </a:solidFill>
+          <a:prstDash val="solid"/>
+        </a:ln>
+      </a:lnStyleLst>
+      <a:effectStyleLst>
+        <a:effectStyle>
+          <a:effectLst>
+            <a:outerShdw blurRad="40000" dist="20000" dir="5400000" rotWithShape="0">
+              <a:srgbClr val="000000">
+                <a:alpha val="38000"/>
+              </a:srgbClr>
+            </a:outerShdw>
+          </a:effectLst>
+        </a:effectStyle>
+        <a:effectStyle>
+          <a:effectLst>
+            <a:outerShdw blurRad="40000" dist="23000" dir="5400000" rotWithShape="0">
+              <a:srgbClr val="000000">
+                <a:alpha val="35000"/>
+              </a:srgbClr>
+            </a:outerShdw>
+          </a:effectLst>
+        </a:effectStyle>
+        <a:effectStyle>
+          <a:effectLst>
+            <a:outerShdw blurRad="40000" dist="23000" dir="5400000" rotWithShape="0">
+              <a:srgbClr val="000000">
+                <a:alpha val="35000"/>
+              </a:srgbClr>
+            </a:outerShdw>
+          </a:effectLst>
+          <a:scene3d>
+            <a:camera prst="orthographicFront">
+              <a:rot lat="0" lon="0" rev="0"/>
+            </a:camera>
+            <a:lightRig rig="threePt" dir="t">
+              <a:rot lat="0" lon="0" rev="1200000"/>
+            </a:lightRig>
+          </a:scene3d>
+          <a:sp3d>
+            <a:bevelT w="63500" h="25400"/>
+          </a:sp3d>
+        </a:effectStyle>
+      </a:effectStyleLst>
+      <a:bgFillStyleLst>
+        <a:solidFill>
+          <a:schemeClr val="phClr"/>
+        </a:solidFill>
+        <a:gradFill rotWithShape="1">
+          <a:gsLst>
+            <a:gs pos="0">
+              <a:schemeClr val="phClr">
+                <a:tint val="40000"/>
+                <a:satMod val="350000"/>
+              </a:schemeClr>
+            </a:gs>
+            <a:gs pos="40000">
+              <a:schemeClr val="phClr">
+                <a:tint val="45000"/>
+                <a:shade val="99000"/>
+                <a:satMod val="350000"/>
+              </a:schemeClr>
+            </a:gs>
+            <a:gs pos="100000">
+              <a:schemeClr val="phClr">
+                <a:shade val="20000"/>
+                <a:satMod val="255000"/>
+              </a:schemeClr>
+            </a:gs>
+          </a:gsLst>
+          <a:path path="circle">
+            <a:fillToRect l="50000" t="-80000" r="50000" b="180000"/>
+          </a:path>
+        </a:gradFill>
+        <a:gradFill rotWithShape="1">
+          <a:gsLst>
+            <a:gs pos="0">
+              <a:schemeClr val="phClr">
+                <a:tint val="80000"/>
+                <a:satMod val="300000"/>
+              </a:schemeClr>
+            </a:gs>
+            <a:gs pos="100000">
+              <a:schemeClr val="phClr">
+                <a:shade val="30000"/>
+                <a:satMod val="200000"/>
+              </a:schemeClr>
+            </a:gs>
+          </a:gsLst>
+          <a:path path="circle">
+            <a:fillToRect l="50000" t="50000" r="50000" b="50000"/>
+          </a:path>
+        </a:gradFill>
+      </a:bgFillStyleLst>
+    </a:fmtScheme>
+  </a:themeElements>
+</a:theme>
+</file>
+
+<file path=ppt/theme/theme3.xml><?xml version="1.0" encoding="utf-8"?>
 <a:theme xmlns:a="http://schemas.openxmlformats.org/drawingml/2006/main" xmlns:r="http://schemas.openxmlformats.org/officeDocument/2006/relationships">
   <a:themeElements>
     <a:clrScheme name="Default">
@@ -20343,283 +21802,4 @@
     </a:fmtScheme>
   </a:themeElements>
 </a:theme>
-</file>
-
-<file path=ppt/theme/theme3.xml><?xml version="1.0" encoding="utf-8"?>
-<a:theme xmlns:a="http://schemas.openxmlformats.org/drawingml/2006/main" xmlns:r="http://schemas.openxmlformats.org/officeDocument/2006/relationships" name="Office Theme">
-  <a:themeElements>
-    <a:clrScheme name="Office">
-      <a:dk1>
-        <a:srgbClr val="000000"/>
-      </a:dk1>
-      <a:lt1>
-        <a:srgbClr val="FFFFFF"/>
-      </a:lt1>
-      <a:dk2>
-        <a:srgbClr val="44546A"/>
-      </a:dk2>
-      <a:lt2>
-        <a:srgbClr val="E7E6E6"/>
-      </a:lt2>
-      <a:accent1>
-        <a:srgbClr val="4472C4"/>
-      </a:accent1>
-      <a:accent2>
-        <a:srgbClr val="ED7D31"/>
-      </a:accent2>
-      <a:accent3>
-        <a:srgbClr val="A5A5A5"/>
-      </a:accent3>
-      <a:accent4>
-        <a:srgbClr val="FFC000"/>
-      </a:accent4>
-      <a:accent5>
-        <a:srgbClr val="5B9BD5"/>
-      </a:accent5>
-      <a:accent6>
-        <a:srgbClr val="70AD47"/>
-      </a:accent6>
-      <a:hlink>
-        <a:srgbClr val="0563C1"/>
-      </a:hlink>
-      <a:folHlink>
-        <a:srgbClr val="954F72"/>
-      </a:folHlink>
-    </a:clrScheme>
-    <a:fontScheme name="Office">
-      <a:majorFont>
-        <a:latin typeface="Arial"/>
-        <a:ea typeface=""/>
-        <a:cs typeface=""/>
-        <a:font script="Jpan" typeface="ＭＳ Ｐゴシック"/>
-        <a:font script="Hang" typeface="맑은 고딕"/>
-        <a:font script="Hans" typeface="宋体"/>
-        <a:font script="Hant" typeface="新細明體"/>
-        <a:font script="Arab" typeface="Times New Roman"/>
-        <a:font script="Hebr" typeface="Times New Roman"/>
-        <a:font script="Thai" typeface="Angsana New"/>
-        <a:font script="Ethi" typeface="Nyala"/>
-        <a:font script="Beng" typeface="Vrinda"/>
-        <a:font script="Gujr" typeface="Shruti"/>
-        <a:font script="Khmr" typeface="MoolBoran"/>
-        <a:font script="Knda" typeface="Tunga"/>
-        <a:font script="Guru" typeface="Raavi"/>
-        <a:font script="Cans" typeface="Euphemia"/>
-        <a:font script="Cher" typeface="Plantagenet Cherokee"/>
-        <a:font script="Yiii" typeface="Microsoft Yi Baiti"/>
-        <a:font script="Tibt" typeface="Microsoft Himalaya"/>
-        <a:font script="Thaa" typeface="MV Boli"/>
-        <a:font script="Deva" typeface="Mangal"/>
-        <a:font script="Telu" typeface="Gautami"/>
-        <a:font script="Taml" typeface="Latha"/>
-        <a:font script="Syrc" typeface="Estrangelo Edessa"/>
-        <a:font script="Orya" typeface="Kalinga"/>
-        <a:font script="Mlym" typeface="Kartika"/>
-        <a:font script="Laoo" typeface="DokChampa"/>
-        <a:font script="Sinh" typeface="Iskoola Pota"/>
-        <a:font script="Mong" typeface="Mongolian Baiti"/>
-        <a:font script="Viet" typeface="Times New Roman"/>
-        <a:font script="Uigh" typeface="Microsoft Uighur"/>
-        <a:font script="Geor" typeface="Sylfaen"/>
-      </a:majorFont>
-      <a:minorFont>
-        <a:latin typeface="Arial"/>
-        <a:ea typeface=""/>
-        <a:cs typeface=""/>
-        <a:font script="Jpan" typeface="ＭＳ Ｐゴシック"/>
-        <a:font script="Hang" typeface="맑은 고딕"/>
-        <a:font script="Hans" typeface="宋体"/>
-        <a:font script="Hant" typeface="新細明體"/>
-        <a:font script="Arab" typeface="Arial"/>
-        <a:font script="Hebr" typeface="Arial"/>
-        <a:font script="Thai" typeface="Cordia New"/>
-        <a:font script="Ethi" typeface="Nyala"/>
-        <a:font script="Beng" typeface="Vrinda"/>
-        <a:font script="Gujr" typeface="Shruti"/>
-        <a:font script="Khmr" typeface="DaunPenh"/>
-        <a:font script="Knda" typeface="Tunga"/>
-        <a:font script="Guru" typeface="Raavi"/>
-        <a:font script="Cans" typeface="Euphemia"/>
-        <a:font script="Cher" typeface="Plantagenet Cherokee"/>
-        <a:font script="Yiii" typeface="Microsoft Yi Baiti"/>
-        <a:font script="Tibt" typeface="Microsoft Himalaya"/>
-        <a:font script="Thaa" typeface="MV Boli"/>
-        <a:font script="Deva" typeface="Mangal"/>
-        <a:font script="Telu" typeface="Gautami"/>
-        <a:font script="Taml" typeface="Latha"/>
-        <a:font script="Syrc" typeface="Estrangelo Edessa"/>
-        <a:font script="Orya" typeface="Kalinga"/>
-        <a:font script="Mlym" typeface="Kartika"/>
-        <a:font script="Laoo" typeface="DokChampa"/>
-        <a:font script="Sinh" typeface="Iskoola Pota"/>
-        <a:font script="Mong" typeface="Mongolian Baiti"/>
-        <a:font script="Viet" typeface="Arial"/>
-        <a:font script="Uigh" typeface="Microsoft Uighur"/>
-        <a:font script="Geor" typeface="Sylfaen"/>
-      </a:minorFont>
-    </a:fontScheme>
-    <a:fmtScheme name="Office">
-      <a:fillStyleLst>
-        <a:solidFill>
-          <a:schemeClr val="phClr"/>
-        </a:solidFill>
-        <a:gradFill rotWithShape="1">
-          <a:gsLst>
-            <a:gs pos="0">
-              <a:schemeClr val="phClr">
-                <a:tint val="50000"/>
-                <a:satMod val="300000"/>
-              </a:schemeClr>
-            </a:gs>
-            <a:gs pos="35000">
-              <a:schemeClr val="phClr">
-                <a:tint val="37000"/>
-                <a:satMod val="300000"/>
-              </a:schemeClr>
-            </a:gs>
-            <a:gs pos="100000">
-              <a:schemeClr val="phClr">
-                <a:tint val="15000"/>
-                <a:satMod val="350000"/>
-              </a:schemeClr>
-            </a:gs>
-          </a:gsLst>
-          <a:lin ang="16200000" scaled="1"/>
-        </a:gradFill>
-        <a:gradFill rotWithShape="1">
-          <a:gsLst>
-            <a:gs pos="0">
-              <a:schemeClr val="phClr">
-                <a:tint val="100000"/>
-                <a:shade val="100000"/>
-                <a:satMod val="130000"/>
-              </a:schemeClr>
-            </a:gs>
-            <a:gs pos="100000">
-              <a:schemeClr val="phClr">
-                <a:tint val="50000"/>
-                <a:shade val="100000"/>
-                <a:satMod val="350000"/>
-              </a:schemeClr>
-            </a:gs>
-          </a:gsLst>
-          <a:lin ang="16200000" scaled="0"/>
-        </a:gradFill>
-      </a:fillStyleLst>
-      <a:lnStyleLst>
-        <a:ln w="9525" cap="flat" cmpd="sng" algn="ctr">
-          <a:solidFill>
-            <a:schemeClr val="phClr">
-              <a:shade val="95000"/>
-              <a:satMod val="105000"/>
-            </a:schemeClr>
-          </a:solidFill>
-          <a:prstDash val="solid"/>
-        </a:ln>
-        <a:ln w="25400" cap="flat" cmpd="sng" algn="ctr">
-          <a:solidFill>
-            <a:schemeClr val="phClr"/>
-          </a:solidFill>
-          <a:prstDash val="solid"/>
-        </a:ln>
-        <a:ln w="38100" cap="flat" cmpd="sng" algn="ctr">
-          <a:solidFill>
-            <a:schemeClr val="phClr"/>
-          </a:solidFill>
-          <a:prstDash val="solid"/>
-        </a:ln>
-      </a:lnStyleLst>
-      <a:effectStyleLst>
-        <a:effectStyle>
-          <a:effectLst>
-            <a:outerShdw blurRad="40000" dist="20000" dir="5400000" rotWithShape="0">
-              <a:srgbClr val="000000">
-                <a:alpha val="38000"/>
-              </a:srgbClr>
-            </a:outerShdw>
-          </a:effectLst>
-        </a:effectStyle>
-        <a:effectStyle>
-          <a:effectLst>
-            <a:outerShdw blurRad="40000" dist="23000" dir="5400000" rotWithShape="0">
-              <a:srgbClr val="000000">
-                <a:alpha val="35000"/>
-              </a:srgbClr>
-            </a:outerShdw>
-          </a:effectLst>
-        </a:effectStyle>
-        <a:effectStyle>
-          <a:effectLst>
-            <a:outerShdw blurRad="40000" dist="23000" dir="5400000" rotWithShape="0">
-              <a:srgbClr val="000000">
-                <a:alpha val="35000"/>
-              </a:srgbClr>
-            </a:outerShdw>
-          </a:effectLst>
-          <a:scene3d>
-            <a:camera prst="orthographicFront">
-              <a:rot lat="0" lon="0" rev="0"/>
-            </a:camera>
-            <a:lightRig rig="threePt" dir="t">
-              <a:rot lat="0" lon="0" rev="1200000"/>
-            </a:lightRig>
-          </a:scene3d>
-          <a:sp3d>
-            <a:bevelT w="63500" h="25400"/>
-          </a:sp3d>
-        </a:effectStyle>
-      </a:effectStyleLst>
-      <a:bgFillStyleLst>
-        <a:solidFill>
-          <a:schemeClr val="phClr"/>
-        </a:solidFill>
-        <a:gradFill rotWithShape="1">
-          <a:gsLst>
-            <a:gs pos="0">
-              <a:schemeClr val="phClr">
-                <a:tint val="40000"/>
-                <a:satMod val="350000"/>
-              </a:schemeClr>
-            </a:gs>
-            <a:gs pos="40000">
-              <a:schemeClr val="phClr">
-                <a:tint val="45000"/>
-                <a:shade val="99000"/>
-                <a:satMod val="350000"/>
-              </a:schemeClr>
-            </a:gs>
-            <a:gs pos="100000">
-              <a:schemeClr val="phClr">
-                <a:shade val="20000"/>
-                <a:satMod val="255000"/>
-              </a:schemeClr>
-            </a:gs>
-          </a:gsLst>
-          <a:path path="circle">
-            <a:fillToRect l="50000" t="-80000" r="50000" b="180000"/>
-          </a:path>
-        </a:gradFill>
-        <a:gradFill rotWithShape="1">
-          <a:gsLst>
-            <a:gs pos="0">
-              <a:schemeClr val="phClr">
-                <a:tint val="80000"/>
-                <a:satMod val="300000"/>
-              </a:schemeClr>
-            </a:gs>
-            <a:gs pos="100000">
-              <a:schemeClr val="phClr">
-                <a:shade val="30000"/>
-                <a:satMod val="200000"/>
-              </a:schemeClr>
-            </a:gs>
-          </a:gsLst>
-          <a:path path="circle">
-            <a:fillToRect l="50000" t="50000" r="50000" b="50000"/>
-          </a:path>
-        </a:gradFill>
-      </a:bgFillStyleLst>
-    </a:fmtScheme>
-  </a:themeElements>
-</a:theme>
 </file>
</xml_diff>